<commit_message>
Updated Project Proposal (need to change diagrams)
</commit_message>
<xml_diff>
--- a/project_01/docs/Muzammil_ENGI301_project_01_proposal.pptx
+++ b/project_01/docs/Muzammil_ENGI301_project_01_proposal.pptx
@@ -5,17 +5,18 @@
     <p:sldMasterId id="2147483648" r:id="rId1"/>
   </p:sldMasterIdLst>
   <p:notesMasterIdLst>
-    <p:notesMasterId r:id="rId7"/>
+    <p:notesMasterId r:id="rId8"/>
   </p:notesMasterIdLst>
   <p:handoutMasterIdLst>
-    <p:handoutMasterId r:id="rId8"/>
+    <p:handoutMasterId r:id="rId9"/>
   </p:handoutMasterIdLst>
   <p:sldIdLst>
     <p:sldId id="261" r:id="rId2"/>
     <p:sldId id="367" r:id="rId3"/>
-    <p:sldId id="368" r:id="rId4"/>
-    <p:sldId id="370" r:id="rId5"/>
-    <p:sldId id="369" r:id="rId6"/>
+    <p:sldId id="371" r:id="rId4"/>
+    <p:sldId id="368" r:id="rId5"/>
+    <p:sldId id="370" r:id="rId6"/>
+    <p:sldId id="369" r:id="rId7"/>
   </p:sldIdLst>
   <p:sldSz cx="12192000" cy="6858000"/>
   <p:notesSz cx="6858000" cy="9144000"/>
@@ -218,7 +219,7 @@
           <a:p>
             <a:fld id="{59041DB8-B66F-4DC8-A96E-33677E0F90FF}" type="datetimeFigureOut">
               <a:rPr lang="en-US" smtClean="0"/>
-              <a:t>2/19/2024</a:t>
+              <a:t>2/26/2024</a:t>
             </a:fld>
             <a:endParaRPr lang="en-US"/>
           </a:p>
@@ -383,7 +384,7 @@
           <a:p>
             <a:fld id="{DEB49C4A-65AC-492D-9701-81B46C3AD0E4}" type="datetimeFigureOut">
               <a:rPr lang="en-US" smtClean="0"/>
-              <a:t>2/19/2024</a:t>
+              <a:t>2/26/2024</a:t>
             </a:fld>
             <a:endParaRPr lang="en-US"/>
           </a:p>
@@ -648,6 +649,178 @@
     </a:lvl9pPr>
   </p:notesStyle>
 </p:notesMaster>
+</file>
+
+<file path=ppt/notesSlides/notesSlide1.xml><?xml version="1.0" encoding="utf-8"?>
+<p:notes xmlns:a="http://schemas.openxmlformats.org/drawingml/2006/main" xmlns:r="http://schemas.openxmlformats.org/officeDocument/2006/relationships" xmlns:p="http://schemas.openxmlformats.org/presentationml/2006/main">
+  <p:cSld>
+    <p:spTree>
+      <p:nvGrpSpPr>
+        <p:cNvPr id="1" name=""/>
+        <p:cNvGrpSpPr/>
+        <p:nvPr/>
+      </p:nvGrpSpPr>
+      <p:grpSpPr>
+        <a:xfrm>
+          <a:off x="0" y="0"/>
+          <a:ext cx="0" cy="0"/>
+          <a:chOff x="0" y="0"/>
+          <a:chExt cx="0" cy="0"/>
+        </a:xfrm>
+      </p:grpSpPr>
+      <p:sp>
+        <p:nvSpPr>
+          <p:cNvPr id="2" name="Slide Image Placeholder 1"/>
+          <p:cNvSpPr>
+            <a:spLocks noGrp="1" noRot="1" noChangeAspect="1"/>
+          </p:cNvSpPr>
+          <p:nvPr>
+            <p:ph type="sldImg"/>
+          </p:nvPr>
+        </p:nvSpPr>
+        <p:spPr/>
+      </p:sp>
+      <p:sp>
+        <p:nvSpPr>
+          <p:cNvPr id="3" name="Notes Placeholder 2"/>
+          <p:cNvSpPr>
+            <a:spLocks noGrp="1"/>
+          </p:cNvSpPr>
+          <p:nvPr>
+            <p:ph type="body" idx="1"/>
+          </p:nvPr>
+        </p:nvSpPr>
+        <p:spPr/>
+        <p:txBody>
+          <a:bodyPr/>
+          <a:lstStyle/>
+          <a:p>
+            <a:r>
+              <a:rPr lang="en-US" dirty="0"/>
+              <a:t>How does it turn on/off</a:t>
+            </a:r>
+          </a:p>
+          <a:p>
+            <a:r>
+              <a:rPr lang="en-US" dirty="0"/>
+              <a:t>Emergency stop</a:t>
+            </a:r>
+          </a:p>
+          <a:p>
+            <a:r>
+              <a:rPr lang="en-US" dirty="0"/>
+              <a:t>How long has it been on</a:t>
+            </a:r>
+          </a:p>
+          <a:p>
+            <a:endParaRPr lang="en-US" dirty="0"/>
+          </a:p>
+          <a:p>
+            <a:r>
+              <a:rPr lang="en-US" dirty="0"/>
+              <a:t>Smaller motor perhaps</a:t>
+            </a:r>
+          </a:p>
+          <a:p>
+            <a:r>
+              <a:rPr lang="en-US" u="sng" dirty="0"/>
+              <a:t>Send Dr </a:t>
+            </a:r>
+            <a:r>
+              <a:rPr lang="en-US" u="sng" dirty="0" err="1"/>
+              <a:t>welsh</a:t>
+            </a:r>
+            <a:r>
+              <a:rPr lang="en-US" u="sng" dirty="0"/>
+              <a:t> email for small stepper motor</a:t>
+            </a:r>
+          </a:p>
+          <a:p>
+            <a:endParaRPr lang="en-US" dirty="0"/>
+          </a:p>
+          <a:p>
+            <a:r>
+              <a:rPr lang="en-US" dirty="0"/>
+              <a:t>Run smaller motor straight from </a:t>
+            </a:r>
+            <a:r>
+              <a:rPr lang="en-US" dirty="0" err="1"/>
+              <a:t>pocketbeagle</a:t>
+            </a:r>
+            <a:r>
+              <a:rPr lang="en-US" dirty="0"/>
+              <a:t> 5v</a:t>
+            </a:r>
+          </a:p>
+          <a:p>
+            <a:r>
+              <a:rPr lang="en-US" dirty="0"/>
+              <a:t>A display for configuration</a:t>
+            </a:r>
+          </a:p>
+          <a:p>
+            <a:endParaRPr lang="en-US" dirty="0"/>
+          </a:p>
+          <a:p>
+            <a:r>
+              <a:rPr lang="en-US" dirty="0"/>
+              <a:t>Real time clock module</a:t>
+            </a:r>
+          </a:p>
+          <a:p>
+            <a:endParaRPr lang="en-US" dirty="0"/>
+          </a:p>
+          <a:p>
+            <a:r>
+              <a:rPr lang="en-US" dirty="0"/>
+              <a:t>Set time before each use?</a:t>
+            </a:r>
+          </a:p>
+          <a:p>
+            <a:endParaRPr lang="en-US" dirty="0"/>
+          </a:p>
+          <a:p>
+            <a:r>
+              <a:rPr lang="en-US" dirty="0"/>
+              <a:t>Think about user interaction</a:t>
+            </a:r>
+          </a:p>
+        </p:txBody>
+      </p:sp>
+      <p:sp>
+        <p:nvSpPr>
+          <p:cNvPr id="4" name="Slide Number Placeholder 3"/>
+          <p:cNvSpPr>
+            <a:spLocks noGrp="1"/>
+          </p:cNvSpPr>
+          <p:nvPr>
+            <p:ph type="sldNum" sz="quarter" idx="5"/>
+          </p:nvPr>
+        </p:nvSpPr>
+        <p:spPr/>
+        <p:txBody>
+          <a:bodyPr/>
+          <a:lstStyle/>
+          <a:p>
+            <a:fld id="{82869989-EB00-4EE7-BCB5-25BDC5BB29F8}" type="slidenum">
+              <a:rPr lang="en-US" smtClean="0"/>
+              <a:t>4</a:t>
+            </a:fld>
+            <a:endParaRPr lang="en-US"/>
+          </a:p>
+        </p:txBody>
+      </p:sp>
+    </p:spTree>
+    <p:extLst>
+      <p:ext uri="{BB962C8B-B14F-4D97-AF65-F5344CB8AC3E}">
+        <p14:creationId xmlns:p14="http://schemas.microsoft.com/office/powerpoint/2010/main" val="4013696882"/>
+      </p:ext>
+    </p:extLst>
+  </p:cSld>
+  <p:clrMapOvr>
+    <a:masterClrMapping/>
+  </p:clrMapOvr>
+</p:notes>
 </file>
 
 <file path=ppt/slideLayouts/slideLayout1.xml><?xml version="1.0" encoding="utf-8"?>
@@ -2791,7 +2964,7 @@
           <a:p>
             <a:fld id="{384A29A4-78C8-47AB-BA06-22CB45938951}" type="datetime1">
               <a:rPr lang="en-US" smtClean="0"/>
-              <a:t>2/19/2024</a:t>
+              <a:t>2/26/2024</a:t>
             </a:fld>
             <a:endParaRPr lang="en-US"/>
           </a:p>
@@ -2986,7 +3159,7 @@
           <a:p>
             <a:fld id="{E1ED4ACF-2D82-46F2-A8E9-23963AA34E86}" type="datetime1">
               <a:rPr lang="en-US" smtClean="0"/>
-              <a:t>2/19/2024</a:t>
+              <a:t>2/26/2024</a:t>
             </a:fld>
             <a:endParaRPr lang="en-US"/>
           </a:p>
@@ -3180,7 +3353,7 @@
           <a:p>
             <a:fld id="{AE374B5B-21A0-4192-BF4C-38187F1A68D8}" type="datetime1">
               <a:rPr lang="en-US" smtClean="0"/>
-              <a:t>2/19/2024</a:t>
+              <a:t>2/26/2024</a:t>
             </a:fld>
             <a:endParaRPr lang="en-US"/>
           </a:p>
@@ -5521,7 +5694,7 @@
           <a:p>
             <a:fld id="{33B5CF7C-B333-48E1-A4A6-83A3C8B73AC0}" type="datetime1">
               <a:rPr lang="en-US" smtClean="0"/>
-              <a:t>2/19/2024</a:t>
+              <a:t>2/26/2024</a:t>
             </a:fld>
             <a:endParaRPr lang="en-US"/>
           </a:p>
@@ -5974,7 +6147,7 @@
           <a:p>
             <a:fld id="{AE320762-5CBF-4210-AB54-376B091119F8}" type="datetime1">
               <a:rPr lang="en-US" smtClean="0"/>
-              <a:t>2/19/2024</a:t>
+              <a:t>2/26/2024</a:t>
             </a:fld>
             <a:endParaRPr lang="en-US"/>
           </a:p>
@@ -6106,7 +6279,7 @@
           <a:p>
             <a:fld id="{7F0DB371-BF5F-4058-A212-1A908E4D2674}" type="datetime1">
               <a:rPr lang="en-US" smtClean="0"/>
-              <a:t>2/19/2024</a:t>
+              <a:t>2/26/2024</a:t>
             </a:fld>
             <a:endParaRPr lang="en-US"/>
           </a:p>
@@ -8039,7 +8212,7 @@
           <a:p>
             <a:fld id="{60A4083B-90AA-48CF-BAD5-00AA24D7F288}" type="datetime1">
               <a:rPr lang="en-US" smtClean="0"/>
-              <a:t>2/19/2024</a:t>
+              <a:t>2/26/2024</a:t>
             </a:fld>
             <a:endParaRPr lang="en-US"/>
           </a:p>
@@ -10298,7 +10471,7 @@
             <a:fld id="{F5BAF629-ECA2-4CF3-B790-9D9BDED98269}" type="datetime1">
               <a:rPr lang="en-US" smtClean="0"/>
               <a:pPr/>
-              <a:t>2/19/2024</a:t>
+              <a:t>2/26/2024</a:t>
             </a:fld>
             <a:endParaRPr lang="en-US"/>
           </a:p>
@@ -14593,7 +14766,7 @@
             <a:fld id="{B51B2453-8663-4C69-AF73-9FD7B1DEC5D0}" type="datetime1">
               <a:rPr lang="en-US" smtClean="0"/>
               <a:pPr/>
-              <a:t>2/19/2024</a:t>
+              <a:t>2/26/2024</a:t>
             </a:fld>
             <a:endParaRPr lang="en-US" dirty="0"/>
           </a:p>
@@ -15292,15 +15465,6 @@
           <a:solidFill>
             <a:srgbClr val="FFFFFF"/>
           </a:solidFill>
-          <a:extLst>
-            <a:ext uri="{909E8E84-426E-40DD-AFC4-6F175D3DCCD1}">
-              <a14:hiddenFill xmlns:a14="http://schemas.microsoft.com/office/drawing/2010/main">
-                <a:solidFill>
-                  <a:srgbClr val="FFFFFF"/>
-                </a:solidFill>
-              </a14:hiddenFill>
-            </a:ext>
-          </a:extLst>
         </p:spPr>
       </p:pic>
     </p:spTree>
@@ -15333,6 +15497,151 @@
   <p:cSld>
     <p:spTree>
       <p:nvGrpSpPr>
+        <p:cNvPr id="1" name="">
+          <a:extLst>
+            <a:ext uri="{FF2B5EF4-FFF2-40B4-BE49-F238E27FC236}">
+              <a16:creationId xmlns:a16="http://schemas.microsoft.com/office/drawing/2014/main" id="{FFA09E20-1EDD-1B8B-1AF1-4CEC749958DF}"/>
+            </a:ext>
+          </a:extLst>
+        </p:cNvPr>
+        <p:cNvGrpSpPr/>
+        <p:nvPr/>
+      </p:nvGrpSpPr>
+      <p:grpSpPr>
+        <a:xfrm>
+          <a:off x="0" y="0"/>
+          <a:ext cx="0" cy="0"/>
+          <a:chOff x="0" y="0"/>
+          <a:chExt cx="0" cy="0"/>
+        </a:xfrm>
+      </p:grpSpPr>
+      <p:sp>
+        <p:nvSpPr>
+          <p:cNvPr id="2" name="Title 1">
+            <a:extLst>
+              <a:ext uri="{FF2B5EF4-FFF2-40B4-BE49-F238E27FC236}">
+                <a16:creationId xmlns:a16="http://schemas.microsoft.com/office/drawing/2014/main" id="{90A0E5AE-2105-CD3F-8426-6C019B31B058}"/>
+              </a:ext>
+            </a:extLst>
+          </p:cNvPr>
+          <p:cNvSpPr>
+            <a:spLocks noGrp="1"/>
+          </p:cNvSpPr>
+          <p:nvPr>
+            <p:ph type="title"/>
+          </p:nvPr>
+        </p:nvSpPr>
+        <p:spPr>
+          <a:xfrm>
+            <a:off x="1295400" y="152400"/>
+            <a:ext cx="9601200" cy="1142385"/>
+          </a:xfrm>
+        </p:spPr>
+        <p:txBody>
+          <a:bodyPr anchor="b">
+            <a:normAutofit/>
+          </a:bodyPr>
+          <a:lstStyle/>
+          <a:p>
+            <a:r>
+              <a:rPr lang="en-US" dirty="0"/>
+              <a:t>Post Meeting Changes</a:t>
+            </a:r>
+          </a:p>
+        </p:txBody>
+      </p:sp>
+      <p:sp>
+        <p:nvSpPr>
+          <p:cNvPr id="3" name="Content Placeholder 2">
+            <a:extLst>
+              <a:ext uri="{FF2B5EF4-FFF2-40B4-BE49-F238E27FC236}">
+                <a16:creationId xmlns:a16="http://schemas.microsoft.com/office/drawing/2014/main" id="{D4020944-3462-9A21-D37D-B6CAD1005314}"/>
+              </a:ext>
+            </a:extLst>
+          </p:cNvPr>
+          <p:cNvSpPr>
+            <a:spLocks noGrp="1"/>
+          </p:cNvSpPr>
+          <p:nvPr>
+            <p:ph sz="half" idx="1"/>
+          </p:nvPr>
+        </p:nvSpPr>
+        <p:spPr>
+          <a:xfrm>
+            <a:off x="190500" y="1485900"/>
+            <a:ext cx="6057900" cy="4610101"/>
+          </a:xfrm>
+        </p:spPr>
+        <p:txBody>
+          <a:bodyPr>
+            <a:normAutofit/>
+          </a:bodyPr>
+          <a:lstStyle/>
+          <a:p>
+            <a:pPr lvl="1">
+              <a:lnSpc>
+                <a:spcPct val="150000"/>
+              </a:lnSpc>
+            </a:pPr>
+            <a:r>
+              <a:rPr lang="en-US" sz="1700" dirty="0"/>
+              <a:t>Use a lower power servo motor that comes with a motor driver and can run off 5V from pocket beagle</a:t>
+            </a:r>
+          </a:p>
+          <a:p>
+            <a:pPr lvl="1">
+              <a:lnSpc>
+                <a:spcPct val="150000"/>
+              </a:lnSpc>
+            </a:pPr>
+            <a:r>
+              <a:rPr lang="en-US" sz="1700" dirty="0"/>
+              <a:t>Add display and interaction from user to control how often the servo motor winds the watch</a:t>
+            </a:r>
+          </a:p>
+          <a:p>
+            <a:pPr lvl="2">
+              <a:lnSpc>
+                <a:spcPct val="150000"/>
+              </a:lnSpc>
+            </a:pPr>
+            <a:r>
+              <a:rPr lang="en-US" sz="1500" dirty="0"/>
+              <a:t>For example, can add a window during the night where the winder turns off (do not disturb function), or can speed up/slow down rate of winding.</a:t>
+            </a:r>
+          </a:p>
+        </p:txBody>
+      </p:sp>
+    </p:spTree>
+    <p:extLst>
+      <p:ext uri="{BB962C8B-B14F-4D97-AF65-F5344CB8AC3E}">
+        <p14:creationId xmlns:p14="http://schemas.microsoft.com/office/powerpoint/2010/main" val="1676153133"/>
+      </p:ext>
+    </p:extLst>
+  </p:cSld>
+  <p:clrMapOvr>
+    <a:masterClrMapping/>
+  </p:clrMapOvr>
+  <mc:AlternateContent xmlns:mc="http://schemas.openxmlformats.org/markup-compatibility/2006" xmlns:p14="http://schemas.microsoft.com/office/powerpoint/2010/main">
+    <mc:Choice Requires="p14">
+      <p:transition spd="med" p14:dur="700">
+        <p:fade/>
+      </p:transition>
+    </mc:Choice>
+    <mc:Fallback xmlns="">
+      <p:transition spd="med">
+        <p:fade/>
+      </p:transition>
+    </mc:Fallback>
+  </mc:AlternateContent>
+</p:sld>
+</file>
+
+<file path=ppt/slides/slide4.xml><?xml version="1.0" encoding="utf-8"?>
+<p:sld xmlns:a="http://schemas.openxmlformats.org/drawingml/2006/main" xmlns:r="http://schemas.openxmlformats.org/officeDocument/2006/relationships" xmlns:p="http://schemas.openxmlformats.org/presentationml/2006/main">
+  <p:cSld>
+    <p:spTree>
+      <p:nvGrpSpPr>
         <p:cNvPr id="1" name=""/>
         <p:cNvGrpSpPr/>
         <p:nvPr/>
@@ -15360,14 +15669,14 @@
           <p:nvPr/>
         </p:nvPicPr>
         <p:blipFill>
-          <a:blip r:embed="rId2"/>
+          <a:blip r:embed="rId3"/>
           <a:stretch>
             <a:fillRect/>
           </a:stretch>
         </p:blipFill>
         <p:spPr>
           <a:xfrm>
-            <a:off x="103684" y="419101"/>
+            <a:off x="107793" y="400051"/>
             <a:ext cx="12090557" cy="6438900"/>
           </a:xfrm>
           <a:prstGeom prst="rect">
@@ -15391,14 +15700,19 @@
             <p:ph type="title"/>
           </p:nvPr>
         </p:nvSpPr>
-        <p:spPr/>
+        <p:spPr>
+          <a:xfrm>
+            <a:off x="101443" y="76200"/>
+            <a:ext cx="10972800" cy="914401"/>
+          </a:xfrm>
+        </p:spPr>
         <p:txBody>
           <a:bodyPr/>
           <a:lstStyle/>
           <a:p>
             <a:r>
               <a:rPr lang="en-US" dirty="0"/>
-              <a:t>System Block Diagram</a:t>
+              <a:t>System Block Diagram (To be updated)</a:t>
             </a:r>
           </a:p>
         </p:txBody>
@@ -15428,7 +15742,7 @@
 </p:sld>
 </file>
 
-<file path=ppt/slides/slide4.xml><?xml version="1.0" encoding="utf-8"?>
+<file path=ppt/slides/slide5.xml><?xml version="1.0" encoding="utf-8"?>
 <p:sld xmlns:a="http://schemas.openxmlformats.org/drawingml/2006/main" xmlns:r="http://schemas.openxmlformats.org/officeDocument/2006/relationships" xmlns:p="http://schemas.openxmlformats.org/presentationml/2006/main">
   <p:cSld>
     <p:spTree>
@@ -15498,7 +15812,7 @@
           <a:p>
             <a:r>
               <a:rPr lang="en-US" dirty="0"/>
-              <a:t>Power Block Diagram</a:t>
+              <a:t>Power Block Diagram (To be updated)</a:t>
             </a:r>
           </a:p>
         </p:txBody>
@@ -15528,7 +15842,7 @@
 </p:sld>
 </file>
 
-<file path=ppt/slides/slide5.xml><?xml version="1.0" encoding="utf-8"?>
+<file path=ppt/slides/slide6.xml><?xml version="1.0" encoding="utf-8"?>
 <p:sld xmlns:a="http://schemas.openxmlformats.org/drawingml/2006/main" xmlns:r="http://schemas.openxmlformats.org/officeDocument/2006/relationships" xmlns:p="http://schemas.openxmlformats.org/presentationml/2006/main">
   <p:cSld>
     <p:spTree>
@@ -15568,7 +15882,7 @@
           <a:p>
             <a:r>
               <a:rPr lang="en-US" dirty="0"/>
-              <a:t>Components / Budget</a:t>
+              <a:t>Components / Budget – Updated 2/26/24</a:t>
             </a:r>
           </a:p>
         </p:txBody>
@@ -15589,14 +15903,14 @@
             <p:ph idx="1"/>
             <p:extLst>
               <p:ext uri="{D42A27DB-BD31-4B8C-83A1-F6EECF244321}">
-                <p14:modId xmlns:p14="http://schemas.microsoft.com/office/powerpoint/2010/main" val="1078728937"/>
+                <p14:modId xmlns:p14="http://schemas.microsoft.com/office/powerpoint/2010/main" val="900851537"/>
               </p:ext>
             </p:extLst>
           </p:nvPr>
         </p:nvGraphicFramePr>
         <p:xfrm>
           <a:off x="609600" y="1295400"/>
-          <a:ext cx="10972800" cy="3977640"/>
+          <a:ext cx="10972800" cy="3606800"/>
         </p:xfrm>
         <a:graphic>
           <a:graphicData uri="http://schemas.openxmlformats.org/drawingml/2006/table">
@@ -15689,14 +16003,122 @@
                     <a:lstStyle/>
                     <a:p>
                       <a:r>
+                        <a:rPr lang="en-US" sz="1800" b="0" i="0" kern="1200" dirty="0">
+                          <a:solidFill>
+                            <a:schemeClr val="tx1"/>
+                          </a:solidFill>
+                          <a:effectLst/>
+                          <a:latin typeface="+mn-lt"/>
+                          <a:ea typeface="+mn-ea"/>
+                          <a:cs typeface="+mn-cs"/>
+                        </a:rPr>
+                        <a:t>5V Stepper Motor + Driver Board (https://a.co/d/exhWMXs)</a:t>
+                      </a:r>
+                    </a:p>
+                  </a:txBody>
+                  <a:tcPr/>
+                </a:tc>
+                <a:tc>
+                  <a:txBody>
+                    <a:bodyPr/>
+                    <a:lstStyle/>
+                    <a:p>
+                      <a:r>
                         <a:rPr lang="en-US" dirty="0"/>
-                        <a:t>Stepper Motor (</a:t>
+                        <a:t>Yes</a:t>
+                      </a:r>
+                    </a:p>
+                  </a:txBody>
+                  <a:tcPr/>
+                </a:tc>
+                <a:tc>
+                  <a:txBody>
+                    <a:bodyPr/>
+                    <a:lstStyle/>
+                    <a:p>
+                      <a:r>
+                        <a:rPr lang="en-US" dirty="0"/>
+                        <a:t>$ 3.00</a:t>
+                      </a:r>
+                    </a:p>
+                  </a:txBody>
+                  <a:tcPr/>
+                </a:tc>
+                <a:extLst>
+                  <a:ext uri="{0D108BD9-81ED-4DB2-BD59-A6C34878D82A}">
+                    <a16:rowId xmlns:a16="http://schemas.microsoft.com/office/drawing/2014/main" val="33313506"/>
+                  </a:ext>
+                </a:extLst>
+              </a:tr>
+              <a:tr h="370840">
+                <a:tc>
+                  <a:txBody>
+                    <a:bodyPr/>
+                    <a:lstStyle/>
+                    <a:p>
+                      <a:r>
+                        <a:rPr lang="en-US" sz="1800" b="0" i="0" kern="1200" dirty="0">
+                          <a:solidFill>
+                            <a:schemeClr val="tx1"/>
+                          </a:solidFill>
+                          <a:effectLst/>
+                          <a:latin typeface="+mn-lt"/>
+                          <a:ea typeface="+mn-ea"/>
+                          <a:cs typeface="+mn-cs"/>
+                        </a:rPr>
+                        <a:t>Standard LCD 16x2 (https://www.adafruit.com/product/181)</a:t>
+                      </a:r>
+                    </a:p>
+                  </a:txBody>
+                  <a:tcPr/>
+                </a:tc>
+                <a:tc>
+                  <a:txBody>
+                    <a:bodyPr/>
+                    <a:lstStyle/>
+                    <a:p>
+                      <a:r>
+                        <a:rPr lang="en-US" dirty="0"/>
+                        <a:t>Yes</a:t>
+                      </a:r>
+                    </a:p>
+                  </a:txBody>
+                  <a:tcPr/>
+                </a:tc>
+                <a:tc>
+                  <a:txBody>
+                    <a:bodyPr/>
+                    <a:lstStyle/>
+                    <a:p>
+                      <a:r>
+                        <a:rPr lang="en-US" dirty="0"/>
+                        <a:t>$ 9.95</a:t>
+                      </a:r>
+                    </a:p>
+                  </a:txBody>
+                  <a:tcPr/>
+                </a:tc>
+                <a:extLst>
+                  <a:ext uri="{0D108BD9-81ED-4DB2-BD59-A6C34878D82A}">
+                    <a16:rowId xmlns:a16="http://schemas.microsoft.com/office/drawing/2014/main" val="2595126612"/>
+                  </a:ext>
+                </a:extLst>
+              </a:tr>
+              <a:tr h="370840">
+                <a:tc>
+                  <a:txBody>
+                    <a:bodyPr/>
+                    <a:lstStyle/>
+                    <a:p>
+                      <a:r>
+                        <a:rPr lang="en-US" dirty="0"/>
+                        <a:t>Joystick (</a:t>
                       </a:r>
                       <a:r>
                         <a:rPr lang="en-US" dirty="0">
                           <a:hlinkClick r:id="rId2"/>
                         </a:rPr>
-                        <a:t>https://a.co/d/fHOB0uw</a:t>
+                        <a:t>https://a.co/d/dYW8PqD</a:t>
                       </a:r>
                       <a:r>
                         <a:rPr lang="en-US" dirty="0"/>
@@ -15726,119 +16148,7 @@
                     <a:p>
                       <a:r>
                         <a:rPr lang="en-US" dirty="0"/>
-                        <a:t>$ 7.99</a:t>
-                      </a:r>
-                    </a:p>
-                  </a:txBody>
-                  <a:tcPr/>
-                </a:tc>
-                <a:extLst>
-                  <a:ext uri="{0D108BD9-81ED-4DB2-BD59-A6C34878D82A}">
-                    <a16:rowId xmlns:a16="http://schemas.microsoft.com/office/drawing/2014/main" val="33313506"/>
-                  </a:ext>
-                </a:extLst>
-              </a:tr>
-              <a:tr h="370840">
-                <a:tc>
-                  <a:txBody>
-                    <a:bodyPr/>
-                    <a:lstStyle/>
-                    <a:p>
-                      <a:r>
-                        <a:rPr lang="en-US" dirty="0"/>
-                        <a:t>Motor Driver (</a:t>
-                      </a:r>
-                      <a:r>
-                        <a:rPr lang="en-US" dirty="0">
-                          <a:hlinkClick r:id="rId3"/>
-                        </a:rPr>
-                        <a:t>https://a.co/d/4HlsoSn</a:t>
-                      </a:r>
-                      <a:r>
-                        <a:rPr lang="en-US" dirty="0"/>
-                        <a:t>)</a:t>
-                      </a:r>
-                    </a:p>
-                  </a:txBody>
-                  <a:tcPr/>
-                </a:tc>
-                <a:tc>
-                  <a:txBody>
-                    <a:bodyPr/>
-                    <a:lstStyle/>
-                    <a:p>
-                      <a:r>
-                        <a:rPr lang="en-US" dirty="0"/>
-                        <a:t>Yes</a:t>
-                      </a:r>
-                    </a:p>
-                  </a:txBody>
-                  <a:tcPr/>
-                </a:tc>
-                <a:tc>
-                  <a:txBody>
-                    <a:bodyPr/>
-                    <a:lstStyle/>
-                    <a:p>
-                      <a:r>
-                        <a:rPr lang="en-US" dirty="0"/>
-                        <a:t>$ 2.04</a:t>
-                      </a:r>
-                    </a:p>
-                  </a:txBody>
-                  <a:tcPr/>
-                </a:tc>
-                <a:extLst>
-                  <a:ext uri="{0D108BD9-81ED-4DB2-BD59-A6C34878D82A}">
-                    <a16:rowId xmlns:a16="http://schemas.microsoft.com/office/drawing/2014/main" val="2595126612"/>
-                  </a:ext>
-                </a:extLst>
-              </a:tr>
-              <a:tr h="370840">
-                <a:tc>
-                  <a:txBody>
-                    <a:bodyPr/>
-                    <a:lstStyle/>
-                    <a:p>
-                      <a:r>
-                        <a:rPr lang="en-US" dirty="0"/>
-                        <a:t>Adjustable Voltage Adapter 2A (</a:t>
-                      </a:r>
-                      <a:r>
-                        <a:rPr lang="en-US" dirty="0">
-                          <a:hlinkClick r:id="rId4"/>
-                        </a:rPr>
-                        <a:t>https://a.co/d/8MbHaqz</a:t>
-                      </a:r>
-                      <a:r>
-                        <a:rPr lang="en-US" dirty="0"/>
-                        <a:t>) </a:t>
-                      </a:r>
-                    </a:p>
-                  </a:txBody>
-                  <a:tcPr/>
-                </a:tc>
-                <a:tc>
-                  <a:txBody>
-                    <a:bodyPr/>
-                    <a:lstStyle/>
-                    <a:p>
-                      <a:r>
-                        <a:rPr lang="en-US" dirty="0"/>
-                        <a:t>Yes</a:t>
-                      </a:r>
-                    </a:p>
-                  </a:txBody>
-                  <a:tcPr/>
-                </a:tc>
-                <a:tc>
-                  <a:txBody>
-                    <a:bodyPr/>
-                    <a:lstStyle/>
-                    <a:p>
-                      <a:r>
-                        <a:rPr lang="en-US" dirty="0"/>
-                        <a:t>$15.98</a:t>
+                        <a:t>$1.33</a:t>
                       </a:r>
                     </a:p>
                   </a:txBody>
@@ -15879,7 +16189,7 @@
                       </a:r>
                       <a:r>
                         <a:rPr lang="en-US" dirty="0">
-                          <a:hlinkClick r:id="rId5"/>
+                          <a:hlinkClick r:id="rId3"/>
                         </a:rPr>
                         <a:t>https://a.co/d/02LscDA</a:t>
                       </a:r>
@@ -15974,60 +16284,6 @@
                 <a:extLst>
                   <a:ext uri="{0D108BD9-81ED-4DB2-BD59-A6C34878D82A}">
                     <a16:rowId xmlns:a16="http://schemas.microsoft.com/office/drawing/2014/main" val="3002400640"/>
-                  </a:ext>
-                </a:extLst>
-              </a:tr>
-              <a:tr h="370840">
-                <a:tc>
-                  <a:txBody>
-                    <a:bodyPr/>
-                    <a:lstStyle/>
-                    <a:p>
-                      <a:r>
-                        <a:rPr lang="en-US" dirty="0"/>
-                        <a:t>Steel Rods (https://a.co/d/drxrzN4)</a:t>
-                      </a:r>
-                    </a:p>
-                  </a:txBody>
-                  <a:tcPr/>
-                </a:tc>
-                <a:tc>
-                  <a:txBody>
-                    <a:bodyPr/>
-                    <a:lstStyle/>
-                    <a:p>
-                      <a:r>
-                        <a:rPr lang="en-US" dirty="0">
-                          <a:solidFill>
-                            <a:srgbClr val="C00000"/>
-                          </a:solidFill>
-                        </a:rPr>
-                        <a:t>No</a:t>
-                      </a:r>
-                    </a:p>
-                  </a:txBody>
-                  <a:tcPr/>
-                </a:tc>
-                <a:tc>
-                  <a:txBody>
-                    <a:bodyPr/>
-                    <a:lstStyle/>
-                    <a:p>
-                      <a:r>
-                        <a:rPr lang="en-US" dirty="0">
-                          <a:solidFill>
-                            <a:srgbClr val="C00000"/>
-                          </a:solidFill>
-                        </a:rPr>
-                        <a:t>$ 6.49</a:t>
-                      </a:r>
-                    </a:p>
-                  </a:txBody>
-                  <a:tcPr/>
-                </a:tc>
-                <a:extLst>
-                  <a:ext uri="{0D108BD9-81ED-4DB2-BD59-A6C34878D82A}">
-                    <a16:rowId xmlns:a16="http://schemas.microsoft.com/office/drawing/2014/main" val="1698356184"/>
                   </a:ext>
                 </a:extLst>
               </a:tr>
@@ -16205,7 +16461,7 @@
                     <a:p>
                       <a:r>
                         <a:rPr lang="en-US" dirty="0"/>
-                        <a:t>$ 33.50</a:t>
+                        <a:t>$ 21.77</a:t>
                       </a:r>
                     </a:p>
                   </a:txBody>

</xml_diff>

<commit_message>
Added Software Block Diagram,
</commit_message>
<xml_diff>
--- a/project_01/docs/Muzammil_ENGI301_project_01_proposal.pptx
+++ b/project_01/docs/Muzammil_ENGI301_project_01_proposal.pptx
@@ -5,10 +5,10 @@
     <p:sldMasterId id="2147483648" r:id="rId1"/>
   </p:sldMasterIdLst>
   <p:notesMasterIdLst>
-    <p:notesMasterId r:id="rId8"/>
+    <p:notesMasterId r:id="rId10"/>
   </p:notesMasterIdLst>
   <p:handoutMasterIdLst>
-    <p:handoutMasterId r:id="rId9"/>
+    <p:handoutMasterId r:id="rId11"/>
   </p:handoutMasterIdLst>
   <p:sldIdLst>
     <p:sldId id="261" r:id="rId2"/>
@@ -16,7 +16,9 @@
     <p:sldId id="371" r:id="rId4"/>
     <p:sldId id="368" r:id="rId5"/>
     <p:sldId id="370" r:id="rId6"/>
-    <p:sldId id="369" r:id="rId7"/>
+    <p:sldId id="372" r:id="rId7"/>
+    <p:sldId id="373" r:id="rId8"/>
+    <p:sldId id="369" r:id="rId9"/>
   </p:sldIdLst>
   <p:sldSz cx="12192000" cy="6858000"/>
   <p:notesSz cx="6858000" cy="9144000"/>
@@ -219,7 +221,7 @@
           <a:p>
             <a:fld id="{59041DB8-B66F-4DC8-A96E-33677E0F90FF}" type="datetimeFigureOut">
               <a:rPr lang="en-US" smtClean="0"/>
-              <a:t>2/26/2024</a:t>
+              <a:t>3/7/2024</a:t>
             </a:fld>
             <a:endParaRPr lang="en-US"/>
           </a:p>
@@ -384,7 +386,7 @@
           <a:p>
             <a:fld id="{DEB49C4A-65AC-492D-9701-81B46C3AD0E4}" type="datetimeFigureOut">
               <a:rPr lang="en-US" smtClean="0"/>
-              <a:t>2/26/2024</a:t>
+              <a:t>3/7/2024</a:t>
             </a:fld>
             <a:endParaRPr lang="en-US"/>
           </a:p>
@@ -2964,7 +2966,7 @@
           <a:p>
             <a:fld id="{384A29A4-78C8-47AB-BA06-22CB45938951}" type="datetime1">
               <a:rPr lang="en-US" smtClean="0"/>
-              <a:t>2/26/2024</a:t>
+              <a:t>3/7/2024</a:t>
             </a:fld>
             <a:endParaRPr lang="en-US"/>
           </a:p>
@@ -3159,7 +3161,7 @@
           <a:p>
             <a:fld id="{E1ED4ACF-2D82-46F2-A8E9-23963AA34E86}" type="datetime1">
               <a:rPr lang="en-US" smtClean="0"/>
-              <a:t>2/26/2024</a:t>
+              <a:t>3/7/2024</a:t>
             </a:fld>
             <a:endParaRPr lang="en-US"/>
           </a:p>
@@ -3353,7 +3355,7 @@
           <a:p>
             <a:fld id="{AE374B5B-21A0-4192-BF4C-38187F1A68D8}" type="datetime1">
               <a:rPr lang="en-US" smtClean="0"/>
-              <a:t>2/26/2024</a:t>
+              <a:t>3/7/2024</a:t>
             </a:fld>
             <a:endParaRPr lang="en-US"/>
           </a:p>
@@ -5694,7 +5696,7 @@
           <a:p>
             <a:fld id="{33B5CF7C-B333-48E1-A4A6-83A3C8B73AC0}" type="datetime1">
               <a:rPr lang="en-US" smtClean="0"/>
-              <a:t>2/26/2024</a:t>
+              <a:t>3/7/2024</a:t>
             </a:fld>
             <a:endParaRPr lang="en-US"/>
           </a:p>
@@ -6147,7 +6149,7 @@
           <a:p>
             <a:fld id="{AE320762-5CBF-4210-AB54-376B091119F8}" type="datetime1">
               <a:rPr lang="en-US" smtClean="0"/>
-              <a:t>2/26/2024</a:t>
+              <a:t>3/7/2024</a:t>
             </a:fld>
             <a:endParaRPr lang="en-US"/>
           </a:p>
@@ -6279,7 +6281,7 @@
           <a:p>
             <a:fld id="{7F0DB371-BF5F-4058-A212-1A908E4D2674}" type="datetime1">
               <a:rPr lang="en-US" smtClean="0"/>
-              <a:t>2/26/2024</a:t>
+              <a:t>3/7/2024</a:t>
             </a:fld>
             <a:endParaRPr lang="en-US"/>
           </a:p>
@@ -8212,7 +8214,7 @@
           <a:p>
             <a:fld id="{60A4083B-90AA-48CF-BAD5-00AA24D7F288}" type="datetime1">
               <a:rPr lang="en-US" smtClean="0"/>
-              <a:t>2/26/2024</a:t>
+              <a:t>3/7/2024</a:t>
             </a:fld>
             <a:endParaRPr lang="en-US"/>
           </a:p>
@@ -10471,7 +10473,7 @@
             <a:fld id="{F5BAF629-ECA2-4CF3-B790-9D9BDED98269}" type="datetime1">
               <a:rPr lang="en-US" smtClean="0"/>
               <a:pPr/>
-              <a:t>2/26/2024</a:t>
+              <a:t>3/7/2024</a:t>
             </a:fld>
             <a:endParaRPr lang="en-US"/>
           </a:p>
@@ -14766,7 +14768,7 @@
             <a:fld id="{B51B2453-8663-4C69-AF73-9FD7B1DEC5D0}" type="datetime1">
               <a:rPr lang="en-US" smtClean="0"/>
               <a:pPr/>
-              <a:t>2/26/2024</a:t>
+              <a:t>3/7/2024</a:t>
             </a:fld>
             <a:endParaRPr lang="en-US" dirty="0"/>
           </a:p>
@@ -15843,6 +15845,270 @@
 </file>
 
 <file path=ppt/slides/slide6.xml><?xml version="1.0" encoding="utf-8"?>
+<p:sld xmlns:a="http://schemas.openxmlformats.org/drawingml/2006/main" xmlns:r="http://schemas.openxmlformats.org/officeDocument/2006/relationships" xmlns:p="http://schemas.openxmlformats.org/presentationml/2006/main">
+  <p:cSld>
+    <p:spTree>
+      <p:nvGrpSpPr>
+        <p:cNvPr id="1" name=""/>
+        <p:cNvGrpSpPr/>
+        <p:nvPr/>
+      </p:nvGrpSpPr>
+      <p:grpSpPr>
+        <a:xfrm>
+          <a:off x="0" y="0"/>
+          <a:ext cx="0" cy="0"/>
+          <a:chOff x="0" y="0"/>
+          <a:chExt cx="0" cy="0"/>
+        </a:xfrm>
+      </p:grpSpPr>
+      <p:sp>
+        <p:nvSpPr>
+          <p:cNvPr id="2" name="Title 1">
+            <a:extLst>
+              <a:ext uri="{FF2B5EF4-FFF2-40B4-BE49-F238E27FC236}">
+                <a16:creationId xmlns:a16="http://schemas.microsoft.com/office/drawing/2014/main" id="{0B6E7D95-69AB-C688-A2BB-237BBFE31705}"/>
+              </a:ext>
+            </a:extLst>
+          </p:cNvPr>
+          <p:cNvSpPr>
+            <a:spLocks noGrp="1"/>
+          </p:cNvSpPr>
+          <p:nvPr>
+            <p:ph type="title"/>
+          </p:nvPr>
+        </p:nvSpPr>
+        <p:spPr/>
+        <p:txBody>
+          <a:bodyPr/>
+          <a:lstStyle/>
+          <a:p>
+            <a:r>
+              <a:rPr lang="en-US" dirty="0"/>
+              <a:t>Software Outline</a:t>
+            </a:r>
+          </a:p>
+        </p:txBody>
+      </p:sp>
+      <p:sp>
+        <p:nvSpPr>
+          <p:cNvPr id="3" name="Content Placeholder 2">
+            <a:extLst>
+              <a:ext uri="{FF2B5EF4-FFF2-40B4-BE49-F238E27FC236}">
+                <a16:creationId xmlns:a16="http://schemas.microsoft.com/office/drawing/2014/main" id="{55D44B0F-E295-3888-C8F8-165ADC4009A0}"/>
+              </a:ext>
+            </a:extLst>
+          </p:cNvPr>
+          <p:cNvSpPr>
+            <a:spLocks noGrp="1"/>
+          </p:cNvSpPr>
+          <p:nvPr>
+            <p:ph idx="1"/>
+          </p:nvPr>
+        </p:nvSpPr>
+        <p:spPr/>
+        <p:txBody>
+          <a:bodyPr/>
+          <a:lstStyle/>
+          <a:p>
+            <a:r>
+              <a:rPr lang="en-US" dirty="0"/>
+              <a:t>Main User inputs: </a:t>
+            </a:r>
+          </a:p>
+          <a:p>
+            <a:pPr lvl="1"/>
+            <a:r>
+              <a:rPr lang="en-US" dirty="0"/>
+              <a:t>Set Time (Optional for ease of use)</a:t>
+            </a:r>
+          </a:p>
+          <a:p>
+            <a:pPr lvl="1"/>
+            <a:r>
+              <a:rPr lang="en-US" dirty="0"/>
+              <a:t>Set interval of rotation (Required)</a:t>
+            </a:r>
+          </a:p>
+          <a:p>
+            <a:pPr lvl="1"/>
+            <a:r>
+              <a:rPr lang="en-US" dirty="0"/>
+              <a:t>Do Not Disturb Mode (Set Duration)</a:t>
+            </a:r>
+          </a:p>
+          <a:p>
+            <a:r>
+              <a:rPr lang="en-US" dirty="0"/>
+              <a:t>Main Components</a:t>
+            </a:r>
+          </a:p>
+          <a:p>
+            <a:pPr lvl="1"/>
+            <a:r>
+              <a:rPr lang="en-US" dirty="0"/>
+              <a:t>Servo (Relies on Inputs from interval, do not disturb</a:t>
+            </a:r>
+          </a:p>
+          <a:p>
+            <a:pPr lvl="1"/>
+            <a:r>
+              <a:rPr lang="en-US" dirty="0"/>
+              <a:t>Real Time Clock implementation (basis of time / interval / do not disturb accuracy)</a:t>
+            </a:r>
+          </a:p>
+          <a:p>
+            <a:pPr lvl="1"/>
+            <a:r>
+              <a:rPr lang="en-US" dirty="0"/>
+              <a:t>16 Bit Display (User is given various options which they can select)</a:t>
+            </a:r>
+          </a:p>
+          <a:p>
+            <a:pPr lvl="1"/>
+            <a:r>
+              <a:rPr lang="en-US" dirty="0"/>
+              <a:t>Joystick (User can select desired option)</a:t>
+            </a:r>
+          </a:p>
+          <a:p>
+            <a:pPr lvl="1"/>
+            <a:endParaRPr lang="en-US" dirty="0"/>
+          </a:p>
+        </p:txBody>
+      </p:sp>
+    </p:spTree>
+    <p:extLst>
+      <p:ext uri="{BB962C8B-B14F-4D97-AF65-F5344CB8AC3E}">
+        <p14:creationId xmlns:p14="http://schemas.microsoft.com/office/powerpoint/2010/main" val="1774086004"/>
+      </p:ext>
+    </p:extLst>
+  </p:cSld>
+  <p:clrMapOvr>
+    <a:masterClrMapping/>
+  </p:clrMapOvr>
+  <mc:AlternateContent xmlns:mc="http://schemas.openxmlformats.org/markup-compatibility/2006" xmlns:p14="http://schemas.microsoft.com/office/powerpoint/2010/main">
+    <mc:Choice Requires="p14">
+      <p:transition spd="med" p14:dur="700">
+        <p:fade/>
+      </p:transition>
+    </mc:Choice>
+    <mc:Fallback xmlns="">
+      <p:transition spd="med">
+        <p:fade/>
+      </p:transition>
+    </mc:Fallback>
+  </mc:AlternateContent>
+</p:sld>
+</file>
+
+<file path=ppt/slides/slide7.xml><?xml version="1.0" encoding="utf-8"?>
+<p:sld xmlns:a="http://schemas.openxmlformats.org/drawingml/2006/main" xmlns:r="http://schemas.openxmlformats.org/officeDocument/2006/relationships" xmlns:p="http://schemas.openxmlformats.org/presentationml/2006/main">
+  <p:cSld>
+    <p:spTree>
+      <p:nvGrpSpPr>
+        <p:cNvPr id="1" name=""/>
+        <p:cNvGrpSpPr/>
+        <p:nvPr/>
+      </p:nvGrpSpPr>
+      <p:grpSpPr>
+        <a:xfrm>
+          <a:off x="0" y="0"/>
+          <a:ext cx="0" cy="0"/>
+          <a:chOff x="0" y="0"/>
+          <a:chExt cx="0" cy="0"/>
+        </a:xfrm>
+      </p:grpSpPr>
+      <p:sp>
+        <p:nvSpPr>
+          <p:cNvPr id="2" name="Title 1">
+            <a:extLst>
+              <a:ext uri="{FF2B5EF4-FFF2-40B4-BE49-F238E27FC236}">
+                <a16:creationId xmlns:a16="http://schemas.microsoft.com/office/drawing/2014/main" id="{D0DEF7B9-F254-3C72-B576-063AB62FA7A4}"/>
+              </a:ext>
+            </a:extLst>
+          </p:cNvPr>
+          <p:cNvSpPr>
+            <a:spLocks noGrp="1"/>
+          </p:cNvSpPr>
+          <p:nvPr>
+            <p:ph type="title"/>
+          </p:nvPr>
+        </p:nvSpPr>
+        <p:spPr>
+          <a:xfrm>
+            <a:off x="342900" y="952500"/>
+            <a:ext cx="2667000" cy="914401"/>
+          </a:xfrm>
+        </p:spPr>
+        <p:txBody>
+          <a:bodyPr>
+            <a:normAutofit fontScale="90000"/>
+          </a:bodyPr>
+          <a:lstStyle/>
+          <a:p>
+            <a:r>
+              <a:rPr lang="en-US" dirty="0"/>
+              <a:t>Software Block Diagram</a:t>
+            </a:r>
+          </a:p>
+        </p:txBody>
+      </p:sp>
+      <p:pic>
+        <p:nvPicPr>
+          <p:cNvPr id="5" name="Picture 4" descr="A diagram of a program&#10;&#10;Description automatically generated">
+            <a:extLst>
+              <a:ext uri="{FF2B5EF4-FFF2-40B4-BE49-F238E27FC236}">
+                <a16:creationId xmlns:a16="http://schemas.microsoft.com/office/drawing/2014/main" id="{E63A1C87-337D-6F74-BF71-2952F7D09001}"/>
+              </a:ext>
+            </a:extLst>
+          </p:cNvPr>
+          <p:cNvPicPr>
+            <a:picLocks noChangeAspect="1"/>
+          </p:cNvPicPr>
+          <p:nvPr/>
+        </p:nvPicPr>
+        <p:blipFill>
+          <a:blip r:embed="rId2"/>
+          <a:stretch>
+            <a:fillRect/>
+          </a:stretch>
+        </p:blipFill>
+        <p:spPr>
+          <a:xfrm>
+            <a:off x="3467100" y="0"/>
+            <a:ext cx="8541970" cy="6858000"/>
+          </a:xfrm>
+          <a:prstGeom prst="rect">
+            <a:avLst/>
+          </a:prstGeom>
+        </p:spPr>
+      </p:pic>
+    </p:spTree>
+    <p:extLst>
+      <p:ext uri="{BB962C8B-B14F-4D97-AF65-F5344CB8AC3E}">
+        <p14:creationId xmlns:p14="http://schemas.microsoft.com/office/powerpoint/2010/main" val="3255759027"/>
+      </p:ext>
+    </p:extLst>
+  </p:cSld>
+  <p:clrMapOvr>
+    <a:masterClrMapping/>
+  </p:clrMapOvr>
+  <mc:AlternateContent xmlns:mc="http://schemas.openxmlformats.org/markup-compatibility/2006" xmlns:p14="http://schemas.microsoft.com/office/powerpoint/2010/main">
+    <mc:Choice Requires="p14">
+      <p:transition spd="med" p14:dur="700">
+        <p:fade/>
+      </p:transition>
+    </mc:Choice>
+    <mc:Fallback xmlns="">
+      <p:transition spd="med">
+        <p:fade/>
+      </p:transition>
+    </mc:Fallback>
+  </mc:AlternateContent>
+</p:sld>
+</file>
+
+<file path=ppt/slides/slide8.xml><?xml version="1.0" encoding="utf-8"?>
 <p:sld xmlns:a="http://schemas.openxmlformats.org/drawingml/2006/main" xmlns:r="http://schemas.openxmlformats.org/officeDocument/2006/relationships" xmlns:p="http://schemas.openxmlformats.org/presentationml/2006/main">
   <p:cSld>
     <p:spTree>

</xml_diff>